<commit_message>
added example file for headings links and buttons
</commit_message>
<xml_diff>
--- a/Web-Frontend-Accessibility-03.pptx
+++ b/Web-Frontend-Accessibility-03.pptx
@@ -18578,24 +18578,7 @@
                 <a:latin typeface="Courier New" panose="02070309020205020404" pitchFamily="49" charset="0"/>
                 <a:cs typeface="Courier New" panose="02070309020205020404" pitchFamily="49" charset="0"/>
               </a:rPr>
-              <a:t>"</a:t>
-            </a:r>
-            <a:r>
-              <a:rPr lang="de-DE" sz="4400" dirty="0">
-                <a:latin typeface="Courier New" panose="02070309020205020404" pitchFamily="49" charset="0"/>
-                <a:cs typeface="Courier New" panose="02070309020205020404" pitchFamily="49" charset="0"/>
-              </a:rPr>
-              <a:t>Fender Stratocaster</a:t>
-            </a:r>
-            <a:r>
-              <a:rPr lang="de-DE" sz="4400" dirty="0">
-                <a:solidFill>
-                  <a:srgbClr val="C00000"/>
-                </a:solidFill>
-                <a:latin typeface="Courier New" panose="02070309020205020404" pitchFamily="49" charset="0"/>
-                <a:cs typeface="Courier New" panose="02070309020205020404" pitchFamily="49" charset="0"/>
-              </a:rPr>
-              <a:t>"</a:t>
+              <a:t>"Fender Stratocaster"</a:t>
             </a:r>
             <a:r>
               <a:rPr lang="de-DE" sz="4400" dirty="0">
@@ -18733,24 +18716,7 @@
                 <a:latin typeface="Courier New" panose="02070309020205020404" pitchFamily="49" charset="0"/>
                 <a:cs typeface="Courier New" panose="02070309020205020404" pitchFamily="49" charset="0"/>
               </a:rPr>
-              <a:t>"</a:t>
-            </a:r>
-            <a:r>
-              <a:rPr lang="de-DE" sz="4400" dirty="0">
-                <a:latin typeface="Courier New" panose="02070309020205020404" pitchFamily="49" charset="0"/>
-                <a:cs typeface="Courier New" panose="02070309020205020404" pitchFamily="49" charset="0"/>
-              </a:rPr>
-              <a:t>Fender Stratocaster</a:t>
-            </a:r>
-            <a:r>
-              <a:rPr lang="de-DE" sz="4400" dirty="0">
-                <a:solidFill>
-                  <a:srgbClr val="C00000"/>
-                </a:solidFill>
-                <a:latin typeface="Courier New" panose="02070309020205020404" pitchFamily="49" charset="0"/>
-                <a:cs typeface="Courier New" panose="02070309020205020404" pitchFamily="49" charset="0"/>
-              </a:rPr>
-              <a:t>" </a:t>
+              <a:t>"Fender Stratocaster" </a:t>
             </a:r>
             <a:r>
               <a:rPr lang="de-DE" sz="4400" dirty="0" err="1">

</xml_diff>

<commit_message>
fixed errors in presentation
</commit_message>
<xml_diff>
--- a/Web-Frontend-Accessibility-03.pptx
+++ b/Web-Frontend-Accessibility-03.pptx
@@ -1292,7 +1292,7 @@
           <a:p>
             <a:fld id="{C275D129-3F7C-D440-B949-9E682A9C35B9}" type="datetimeFigureOut">
               <a:rPr lang="de-DE" smtClean="0"/>
-              <a:t>20.01.25</a:t>
+              <a:t>21.01.25</a:t>
             </a:fld>
             <a:endParaRPr lang="de-DE"/>
           </a:p>
@@ -1982,7 +1982,7 @@
           <a:p>
             <a:fld id="{EFD02665-02A2-134A-B107-F4B484FCD166}" type="datetimeFigureOut">
               <a:rPr lang="de-DE" smtClean="0"/>
-              <a:t>20.01.25</a:t>
+              <a:t>21.01.25</a:t>
             </a:fld>
             <a:endParaRPr lang="de-DE"/>
           </a:p>
@@ -2180,7 +2180,7 @@
           <a:p>
             <a:fld id="{EFD02665-02A2-134A-B107-F4B484FCD166}" type="datetimeFigureOut">
               <a:rPr lang="de-DE" smtClean="0"/>
-              <a:t>20.01.25</a:t>
+              <a:t>21.01.25</a:t>
             </a:fld>
             <a:endParaRPr lang="de-DE"/>
           </a:p>
@@ -2388,7 +2388,7 @@
           <a:p>
             <a:fld id="{EFD02665-02A2-134A-B107-F4B484FCD166}" type="datetimeFigureOut">
               <a:rPr lang="de-DE" smtClean="0"/>
-              <a:t>20.01.25</a:t>
+              <a:t>21.01.25</a:t>
             </a:fld>
             <a:endParaRPr lang="de-DE"/>
           </a:p>
@@ -2586,7 +2586,7 @@
           <a:p>
             <a:fld id="{EFD02665-02A2-134A-B107-F4B484FCD166}" type="datetimeFigureOut">
               <a:rPr lang="de-DE" smtClean="0"/>
-              <a:t>20.01.25</a:t>
+              <a:t>21.01.25</a:t>
             </a:fld>
             <a:endParaRPr lang="de-DE"/>
           </a:p>
@@ -2861,7 +2861,7 @@
           <a:p>
             <a:fld id="{EFD02665-02A2-134A-B107-F4B484FCD166}" type="datetimeFigureOut">
               <a:rPr lang="de-DE" smtClean="0"/>
-              <a:t>20.01.25</a:t>
+              <a:t>21.01.25</a:t>
             </a:fld>
             <a:endParaRPr lang="de-DE"/>
           </a:p>
@@ -3126,7 +3126,7 @@
           <a:p>
             <a:fld id="{EFD02665-02A2-134A-B107-F4B484FCD166}" type="datetimeFigureOut">
               <a:rPr lang="de-DE" smtClean="0"/>
-              <a:t>20.01.25</a:t>
+              <a:t>21.01.25</a:t>
             </a:fld>
             <a:endParaRPr lang="de-DE"/>
           </a:p>
@@ -3538,7 +3538,7 @@
           <a:p>
             <a:fld id="{EFD02665-02A2-134A-B107-F4B484FCD166}" type="datetimeFigureOut">
               <a:rPr lang="de-DE" smtClean="0"/>
-              <a:t>20.01.25</a:t>
+              <a:t>21.01.25</a:t>
             </a:fld>
             <a:endParaRPr lang="de-DE"/>
           </a:p>
@@ -3679,7 +3679,7 @@
           <a:p>
             <a:fld id="{EFD02665-02A2-134A-B107-F4B484FCD166}" type="datetimeFigureOut">
               <a:rPr lang="de-DE" smtClean="0"/>
-              <a:t>20.01.25</a:t>
+              <a:t>21.01.25</a:t>
             </a:fld>
             <a:endParaRPr lang="de-DE"/>
           </a:p>
@@ -3792,7 +3792,7 @@
           <a:p>
             <a:fld id="{EFD02665-02A2-134A-B107-F4B484FCD166}" type="datetimeFigureOut">
               <a:rPr lang="de-DE" smtClean="0"/>
-              <a:t>20.01.25</a:t>
+              <a:t>21.01.25</a:t>
             </a:fld>
             <a:endParaRPr lang="de-DE"/>
           </a:p>
@@ -4103,7 +4103,7 @@
           <a:p>
             <a:fld id="{EFD02665-02A2-134A-B107-F4B484FCD166}" type="datetimeFigureOut">
               <a:rPr lang="de-DE" smtClean="0"/>
-              <a:t>20.01.25</a:t>
+              <a:t>21.01.25</a:t>
             </a:fld>
             <a:endParaRPr lang="de-DE"/>
           </a:p>
@@ -4391,7 +4391,7 @@
           <a:p>
             <a:fld id="{EFD02665-02A2-134A-B107-F4B484FCD166}" type="datetimeFigureOut">
               <a:rPr lang="de-DE" smtClean="0"/>
-              <a:t>20.01.25</a:t>
+              <a:t>21.01.25</a:t>
             </a:fld>
             <a:endParaRPr lang="de-DE"/>
           </a:p>
@@ -4632,7 +4632,7 @@
           <a:p>
             <a:fld id="{EFD02665-02A2-134A-B107-F4B484FCD166}" type="datetimeFigureOut">
               <a:rPr lang="de-DE" smtClean="0"/>
-              <a:t>20.01.25</a:t>
+              <a:t>21.01.25</a:t>
             </a:fld>
             <a:endParaRPr lang="de-DE"/>
           </a:p>
@@ -7157,7 +7157,7 @@
                 <a:latin typeface="Courier New" panose="02070309020205020404" pitchFamily="49" charset="0"/>
                 <a:cs typeface="Courier New" panose="02070309020205020404" pitchFamily="49" charset="0"/>
               </a:rPr>
-              <a:t>&lt;/a&gt;</a:t>
+              <a:t>&lt;/button&gt;</a:t>
             </a:r>
           </a:p>
         </p:txBody>
@@ -11344,7 +11344,7 @@
         <p:spPr/>
         <p:txBody>
           <a:bodyPr>
-            <a:normAutofit fontScale="85000" lnSpcReduction="20000"/>
+            <a:normAutofit fontScale="77500" lnSpcReduction="20000"/>
           </a:bodyPr>
           <a:lstStyle/>
           <a:p>
@@ -11505,7 +11505,7 @@
             </a:r>
             <a:r>
               <a:rPr lang="en-GB" dirty="0"/>
-              <a:t> SVG's (per Definition </a:t>
+              <a:t> SVG's (per ARIA Definition </a:t>
             </a:r>
             <a:r>
               <a:rPr lang="en-GB" dirty="0" err="1"/>
@@ -11521,15 +11521,7 @@
             </a:r>
             <a:r>
               <a:rPr lang="en-GB" dirty="0"/>
-              <a:t> </a:t>
-            </a:r>
-            <a:r>
-              <a:rPr lang="en-GB" dirty="0" err="1"/>
-              <a:t>ein</a:t>
-            </a:r>
-            <a:r>
-              <a:rPr lang="en-GB" dirty="0"/>
-              <a:t> "graphics-document")</a:t>
+              <a:t> hat role "graphics-document")</a:t>
             </a:r>
           </a:p>
         </p:txBody>
@@ -12959,7 +12951,7 @@
                 <a:latin typeface="Courier New" panose="02070309020205020404" pitchFamily="49" charset="0"/>
                 <a:cs typeface="Courier New" panose="02070309020205020404" pitchFamily="49" charset="0"/>
               </a:rPr>
-              <a:t>.wrapper { backgorund-image: url(</a:t>
+              <a:t>.wrapper { background-image: url(</a:t>
             </a:r>
             <a:r>
               <a:rPr lang="en-DE" sz="3200" dirty="0">
@@ -15938,7 +15930,15 @@
           <a:p>
             <a:r>
               <a:rPr lang="en-DE" dirty="0"/>
-              <a:t>Images - Komeplexe Images</a:t>
+              <a:t>Images </a:t>
+            </a:r>
+            <a:r>
+              <a:rPr lang="en-DE"/>
+              <a:t>- Komplexe </a:t>
+            </a:r>
+            <a:r>
+              <a:rPr lang="en-DE" dirty="0"/>
+              <a:t>Images</a:t>
             </a:r>
             <a:endParaRPr lang="de-DE" sz="2800" dirty="0">
               <a:solidFill>

</xml_diff>

<commit_message>
added presentation part 5 and updated examples
</commit_message>
<xml_diff>
--- a/Web-Frontend-Accessibility-03.pptx
+++ b/Web-Frontend-Accessibility-03.pptx
@@ -1292,7 +1292,7 @@
           <a:p>
             <a:fld id="{C275D129-3F7C-D440-B949-9E682A9C35B9}" type="datetimeFigureOut">
               <a:rPr lang="de-DE" smtClean="0"/>
-              <a:t>21.01.25</a:t>
+              <a:t>31.01.25</a:t>
             </a:fld>
             <a:endParaRPr lang="de-DE"/>
           </a:p>
@@ -1450,7 +1450,7 @@
           <a:p>
             <a:fld id="{3A2CC9D8-2405-D04A-8A34-BA92D321B7F1}" type="slidenum">
               <a:rPr lang="de-DE" smtClean="0"/>
-              <a:t>‹#›</a:t>
+              <a:t>‹Nr.›</a:t>
             </a:fld>
             <a:endParaRPr lang="de-DE"/>
           </a:p>
@@ -1982,7 +1982,7 @@
           <a:p>
             <a:fld id="{EFD02665-02A2-134A-B107-F4B484FCD166}" type="datetimeFigureOut">
               <a:rPr lang="de-DE" smtClean="0"/>
-              <a:t>21.01.25</a:t>
+              <a:t>31.01.25</a:t>
             </a:fld>
             <a:endParaRPr lang="de-DE"/>
           </a:p>
@@ -2036,7 +2036,7 @@
           <a:p>
             <a:fld id="{C271625C-EFA6-3F46-B7A3-CFBA350985D8}" type="slidenum">
               <a:rPr lang="de-DE" smtClean="0"/>
-              <a:t>‹#›</a:t>
+              <a:t>‹Nr.›</a:t>
             </a:fld>
             <a:endParaRPr lang="de-DE"/>
           </a:p>
@@ -2180,7 +2180,7 @@
           <a:p>
             <a:fld id="{EFD02665-02A2-134A-B107-F4B484FCD166}" type="datetimeFigureOut">
               <a:rPr lang="de-DE" smtClean="0"/>
-              <a:t>21.01.25</a:t>
+              <a:t>31.01.25</a:t>
             </a:fld>
             <a:endParaRPr lang="de-DE"/>
           </a:p>
@@ -2234,7 +2234,7 @@
           <a:p>
             <a:fld id="{C271625C-EFA6-3F46-B7A3-CFBA350985D8}" type="slidenum">
               <a:rPr lang="de-DE" smtClean="0"/>
-              <a:t>‹#›</a:t>
+              <a:t>‹Nr.›</a:t>
             </a:fld>
             <a:endParaRPr lang="de-DE"/>
           </a:p>
@@ -2388,7 +2388,7 @@
           <a:p>
             <a:fld id="{EFD02665-02A2-134A-B107-F4B484FCD166}" type="datetimeFigureOut">
               <a:rPr lang="de-DE" smtClean="0"/>
-              <a:t>21.01.25</a:t>
+              <a:t>31.01.25</a:t>
             </a:fld>
             <a:endParaRPr lang="de-DE"/>
           </a:p>
@@ -2442,7 +2442,7 @@
           <a:p>
             <a:fld id="{C271625C-EFA6-3F46-B7A3-CFBA350985D8}" type="slidenum">
               <a:rPr lang="de-DE" smtClean="0"/>
-              <a:t>‹#›</a:t>
+              <a:t>‹Nr.›</a:t>
             </a:fld>
             <a:endParaRPr lang="de-DE"/>
           </a:p>
@@ -2586,7 +2586,7 @@
           <a:p>
             <a:fld id="{EFD02665-02A2-134A-B107-F4B484FCD166}" type="datetimeFigureOut">
               <a:rPr lang="de-DE" smtClean="0"/>
-              <a:t>21.01.25</a:t>
+              <a:t>31.01.25</a:t>
             </a:fld>
             <a:endParaRPr lang="de-DE"/>
           </a:p>
@@ -2640,7 +2640,7 @@
           <a:p>
             <a:fld id="{C271625C-EFA6-3F46-B7A3-CFBA350985D8}" type="slidenum">
               <a:rPr lang="de-DE" smtClean="0"/>
-              <a:t>‹#›</a:t>
+              <a:t>‹Nr.›</a:t>
             </a:fld>
             <a:endParaRPr lang="de-DE"/>
           </a:p>
@@ -2861,7 +2861,7 @@
           <a:p>
             <a:fld id="{EFD02665-02A2-134A-B107-F4B484FCD166}" type="datetimeFigureOut">
               <a:rPr lang="de-DE" smtClean="0"/>
-              <a:t>21.01.25</a:t>
+              <a:t>31.01.25</a:t>
             </a:fld>
             <a:endParaRPr lang="de-DE"/>
           </a:p>
@@ -2915,7 +2915,7 @@
           <a:p>
             <a:fld id="{C271625C-EFA6-3F46-B7A3-CFBA350985D8}" type="slidenum">
               <a:rPr lang="de-DE" smtClean="0"/>
-              <a:t>‹#›</a:t>
+              <a:t>‹Nr.›</a:t>
             </a:fld>
             <a:endParaRPr lang="de-DE"/>
           </a:p>
@@ -3126,7 +3126,7 @@
           <a:p>
             <a:fld id="{EFD02665-02A2-134A-B107-F4B484FCD166}" type="datetimeFigureOut">
               <a:rPr lang="de-DE" smtClean="0"/>
-              <a:t>21.01.25</a:t>
+              <a:t>31.01.25</a:t>
             </a:fld>
             <a:endParaRPr lang="de-DE"/>
           </a:p>
@@ -3180,7 +3180,7 @@
           <a:p>
             <a:fld id="{C271625C-EFA6-3F46-B7A3-CFBA350985D8}" type="slidenum">
               <a:rPr lang="de-DE" smtClean="0"/>
-              <a:t>‹#›</a:t>
+              <a:t>‹Nr.›</a:t>
             </a:fld>
             <a:endParaRPr lang="de-DE"/>
           </a:p>
@@ -3538,7 +3538,7 @@
           <a:p>
             <a:fld id="{EFD02665-02A2-134A-B107-F4B484FCD166}" type="datetimeFigureOut">
               <a:rPr lang="de-DE" smtClean="0"/>
-              <a:t>21.01.25</a:t>
+              <a:t>31.01.25</a:t>
             </a:fld>
             <a:endParaRPr lang="de-DE"/>
           </a:p>
@@ -3592,7 +3592,7 @@
           <a:p>
             <a:fld id="{C271625C-EFA6-3F46-B7A3-CFBA350985D8}" type="slidenum">
               <a:rPr lang="de-DE" smtClean="0"/>
-              <a:t>‹#›</a:t>
+              <a:t>‹Nr.›</a:t>
             </a:fld>
             <a:endParaRPr lang="de-DE"/>
           </a:p>
@@ -3679,7 +3679,7 @@
           <a:p>
             <a:fld id="{EFD02665-02A2-134A-B107-F4B484FCD166}" type="datetimeFigureOut">
               <a:rPr lang="de-DE" smtClean="0"/>
-              <a:t>21.01.25</a:t>
+              <a:t>31.01.25</a:t>
             </a:fld>
             <a:endParaRPr lang="de-DE"/>
           </a:p>
@@ -3733,7 +3733,7 @@
           <a:p>
             <a:fld id="{C271625C-EFA6-3F46-B7A3-CFBA350985D8}" type="slidenum">
               <a:rPr lang="de-DE" smtClean="0"/>
-              <a:t>‹#›</a:t>
+              <a:t>‹Nr.›</a:t>
             </a:fld>
             <a:endParaRPr lang="de-DE"/>
           </a:p>
@@ -3792,7 +3792,7 @@
           <a:p>
             <a:fld id="{EFD02665-02A2-134A-B107-F4B484FCD166}" type="datetimeFigureOut">
               <a:rPr lang="de-DE" smtClean="0"/>
-              <a:t>21.01.25</a:t>
+              <a:t>31.01.25</a:t>
             </a:fld>
             <a:endParaRPr lang="de-DE"/>
           </a:p>
@@ -3846,7 +3846,7 @@
           <a:p>
             <a:fld id="{C271625C-EFA6-3F46-B7A3-CFBA350985D8}" type="slidenum">
               <a:rPr lang="de-DE" smtClean="0"/>
-              <a:t>‹#›</a:t>
+              <a:t>‹Nr.›</a:t>
             </a:fld>
             <a:endParaRPr lang="de-DE"/>
           </a:p>
@@ -4103,7 +4103,7 @@
           <a:p>
             <a:fld id="{EFD02665-02A2-134A-B107-F4B484FCD166}" type="datetimeFigureOut">
               <a:rPr lang="de-DE" smtClean="0"/>
-              <a:t>21.01.25</a:t>
+              <a:t>31.01.25</a:t>
             </a:fld>
             <a:endParaRPr lang="de-DE"/>
           </a:p>
@@ -4157,7 +4157,7 @@
           <a:p>
             <a:fld id="{C271625C-EFA6-3F46-B7A3-CFBA350985D8}" type="slidenum">
               <a:rPr lang="de-DE" smtClean="0"/>
-              <a:t>‹#›</a:t>
+              <a:t>‹Nr.›</a:t>
             </a:fld>
             <a:endParaRPr lang="de-DE"/>
           </a:p>
@@ -4391,7 +4391,7 @@
           <a:p>
             <a:fld id="{EFD02665-02A2-134A-B107-F4B484FCD166}" type="datetimeFigureOut">
               <a:rPr lang="de-DE" smtClean="0"/>
-              <a:t>21.01.25</a:t>
+              <a:t>31.01.25</a:t>
             </a:fld>
             <a:endParaRPr lang="de-DE"/>
           </a:p>
@@ -4445,7 +4445,7 @@
           <a:p>
             <a:fld id="{C271625C-EFA6-3F46-B7A3-CFBA350985D8}" type="slidenum">
               <a:rPr lang="de-DE" smtClean="0"/>
-              <a:t>‹#›</a:t>
+              <a:t>‹Nr.›</a:t>
             </a:fld>
             <a:endParaRPr lang="de-DE"/>
           </a:p>
@@ -4632,7 +4632,7 @@
           <a:p>
             <a:fld id="{EFD02665-02A2-134A-B107-F4B484FCD166}" type="datetimeFigureOut">
               <a:rPr lang="de-DE" smtClean="0"/>
-              <a:t>21.01.25</a:t>
+              <a:t>31.01.25</a:t>
             </a:fld>
             <a:endParaRPr lang="de-DE"/>
           </a:p>
@@ -4722,7 +4722,7 @@
           <a:p>
             <a:fld id="{C271625C-EFA6-3F46-B7A3-CFBA350985D8}" type="slidenum">
               <a:rPr lang="de-DE" smtClean="0"/>
-              <a:t>‹#›</a:t>
+              <a:t>‹Nr.›</a:t>
             </a:fld>
             <a:endParaRPr lang="de-DE"/>
           </a:p>

</xml_diff>